<commit_message>
Petite MAJ de la Revue
Ajout image Cycle en V dans PPT
</commit_message>
<xml_diff>
--- a/REVUES/REVUE ANALYSE/RevueAnalysePPT.pptx
+++ b/REVUES/REVUE ANALYSE/RevueAnalysePPT.pptx
@@ -397,13 +397,18 @@
             <a:fld id="{CB283655-4BFB-43B1-BAF6-B56C5128041C}" type="slidenum">
               <a:rPr lang="fr-FR"/>
               <a:pPr/>
-              <a:t>‹N°›</a:t>
+              <a:t>‹#›</a:t>
             </a:fld>
             <a:endParaRPr lang="fr-FR"/>
           </a:p>
         </p:txBody>
       </p:sp>
     </p:spTree>
+    <p:extLst>
+      <p:ext uri="{BB962C8B-B14F-4D97-AF65-F5344CB8AC3E}">
+        <p14:creationId xmlns:p14="http://schemas.microsoft.com/office/powerpoint/2010/main" val="3529233460"/>
+      </p:ext>
+    </p:extLst>
   </p:cSld>
   <p:clrMap bg1="lt1" tx1="dk1" bg2="lt2" tx2="dk2" accent1="accent1" accent2="accent2" accent3="accent3" accent4="accent4" accent5="accent5" accent6="accent6" hlink="hlink" folHlink="folHlink"/>
 </p:handoutMaster>
@@ -544,7 +549,7 @@
         <p:nvSpPr>
           <p:cNvPr id="14340" name="Rectangle 4"/>
           <p:cNvSpPr>
-            <a:spLocks noRot="1" noChangeArrowheads="1" noTextEdit="1"/>
+            <a:spLocks noGrp="1" noRot="1" noChangeAspect="1" noChangeArrowheads="1" noTextEdit="1"/>
           </p:cNvSpPr>
           <p:nvPr>
             <p:ph type="sldImg" idx="2"/>
@@ -739,13 +744,18 @@
             <a:fld id="{833C8364-6B03-4B98-A245-7B0F0BD81F7E}" type="slidenum">
               <a:rPr lang="fr-FR"/>
               <a:pPr/>
-              <a:t>‹N°›</a:t>
+              <a:t>‹#›</a:t>
             </a:fld>
             <a:endParaRPr lang="fr-FR"/>
           </a:p>
         </p:txBody>
       </p:sp>
     </p:spTree>
+    <p:extLst>
+      <p:ext uri="{BB962C8B-B14F-4D97-AF65-F5344CB8AC3E}">
+        <p14:creationId xmlns:p14="http://schemas.microsoft.com/office/powerpoint/2010/main" val="2452365414"/>
+      </p:ext>
+    </p:extLst>
   </p:cSld>
   <p:clrMap bg1="lt1" tx1="dk1" bg2="lt2" tx2="dk2" accent1="accent1" accent2="accent2" accent3="accent3" accent4="accent4" accent5="accent5" accent6="accent6" hlink="hlink" folHlink="folHlink"/>
   <p:notesStyle>
@@ -920,7 +930,7 @@
         <p:nvSpPr>
           <p:cNvPr id="16386" name="Rectangle 2"/>
           <p:cNvSpPr>
-            <a:spLocks noRot="1" noChangeArrowheads="1" noTextEdit="1"/>
+            <a:spLocks noGrp="1" noRot="1" noChangeAspect="1" noChangeArrowheads="1" noTextEdit="1"/>
           </p:cNvSpPr>
           <p:nvPr>
             <p:ph type="sldImg"/>
@@ -1010,7 +1020,7 @@
         <p:nvSpPr>
           <p:cNvPr id="18434" name="Rectangle 2"/>
           <p:cNvSpPr>
-            <a:spLocks noRot="1" noChangeArrowheads="1" noTextEdit="1"/>
+            <a:spLocks noGrp="1" noRot="1" noChangeAspect="1" noChangeArrowheads="1" noTextEdit="1"/>
           </p:cNvSpPr>
           <p:nvPr>
             <p:ph type="sldImg"/>
@@ -1100,7 +1110,7 @@
         <p:nvSpPr>
           <p:cNvPr id="20482" name="Rectangle 2"/>
           <p:cNvSpPr>
-            <a:spLocks noRot="1" noChangeArrowheads="1" noTextEdit="1"/>
+            <a:spLocks noGrp="1" noRot="1" noChangeAspect="1" noChangeArrowheads="1" noTextEdit="1"/>
           </p:cNvSpPr>
           <p:nvPr>
             <p:ph type="sldImg"/>
@@ -1190,7 +1200,7 @@
         <p:nvSpPr>
           <p:cNvPr id="22530" name="Rectangle 2"/>
           <p:cNvSpPr>
-            <a:spLocks noRot="1" noChangeArrowheads="1" noTextEdit="1"/>
+            <a:spLocks noGrp="1" noRot="1" noChangeAspect="1" noChangeArrowheads="1" noTextEdit="1"/>
           </p:cNvSpPr>
           <p:nvPr>
             <p:ph type="sldImg"/>
@@ -1280,7 +1290,7 @@
         <p:nvSpPr>
           <p:cNvPr id="24578" name="Rectangle 2"/>
           <p:cNvSpPr>
-            <a:spLocks noRot="1" noChangeArrowheads="1" noTextEdit="1"/>
+            <a:spLocks noGrp="1" noRot="1" noChangeAspect="1" noChangeArrowheads="1" noTextEdit="1"/>
           </p:cNvSpPr>
           <p:nvPr>
             <p:ph type="sldImg"/>
@@ -1505,7 +1515,7 @@
             <a:fld id="{FFA7CAA4-E192-42FB-A5C2-29EE6B338226}" type="datetimeFigureOut">
               <a:rPr lang="en-US"/>
               <a:pPr/>
-              <a:t>1/30/2013</a:t>
+              <a:t>31/01/13</a:t>
             </a:fld>
             <a:endParaRPr lang="en-US"/>
           </a:p>
@@ -1563,7 +1573,7 @@
             <a:fld id="{B022ABEC-0C82-4DE7-9A23-828F0BC36F42}" type="slidenum">
               <a:rPr lang="en-US"/>
               <a:pPr/>
-              <a:t>‹N°›</a:t>
+              <a:t>‹#›</a:t>
             </a:fld>
             <a:endParaRPr lang="en-US"/>
           </a:p>
@@ -1574,7 +1584,7 @@
   <p:clrMapOvr>
     <a:overrideClrMapping bg1="dk1" tx1="lt1" bg2="dk2" tx2="lt2" accent1="accent1" accent2="accent2" accent3="accent3" accent4="accent4" accent5="accent5" accent6="accent6" hlink="hlink" folHlink="folHlink"/>
   </p:clrMapOvr>
-  <p:transition spd="med">
+  <p:transition xmlns:p14="http://schemas.microsoft.com/office/powerpoint/2010/main" spd="med">
     <p:newsflash/>
   </p:transition>
 </p:sldLayout>
@@ -1694,7 +1704,7 @@
             <a:fld id="{4A061154-22B2-4010-9DA2-5655ABCEF8F8}" type="datetimeFigureOut">
               <a:rPr lang="en-US"/>
               <a:pPr/>
-              <a:t>1/30/2013</a:t>
+              <a:t>31/01/13</a:t>
             </a:fld>
             <a:endParaRPr lang="en-US"/>
           </a:p>
@@ -1748,7 +1758,7 @@
             <a:fld id="{75C09270-A19E-4E4E-859A-B8BA672EE28D}" type="slidenum">
               <a:rPr lang="en-US"/>
               <a:pPr/>
-              <a:t>‹N°›</a:t>
+              <a:t>‹#›</a:t>
             </a:fld>
             <a:endParaRPr lang="en-US"/>
           </a:p>
@@ -1759,7 +1769,7 @@
   <p:clrMapOvr>
     <a:masterClrMapping/>
   </p:clrMapOvr>
-  <p:transition spd="med">
+  <p:transition xmlns:p14="http://schemas.microsoft.com/office/powerpoint/2010/main" spd="med">
     <p:newsflash/>
   </p:transition>
 </p:sldLayout>
@@ -1889,7 +1899,7 @@
             <a:fld id="{BE2AE80A-E551-4396-8318-DC031FB32674}" type="datetimeFigureOut">
               <a:rPr lang="en-US"/>
               <a:pPr/>
-              <a:t>1/30/2013</a:t>
+              <a:t>31/01/13</a:t>
             </a:fld>
             <a:endParaRPr lang="en-US"/>
           </a:p>
@@ -1943,7 +1953,7 @@
             <a:fld id="{564B8AF4-DF85-402E-AB52-002854EAA7AD}" type="slidenum">
               <a:rPr lang="en-US"/>
               <a:pPr/>
-              <a:t>‹N°›</a:t>
+              <a:t>‹#›</a:t>
             </a:fld>
             <a:endParaRPr lang="en-US"/>
           </a:p>
@@ -1954,7 +1964,7 @@
   <p:clrMapOvr>
     <a:masterClrMapping/>
   </p:clrMapOvr>
-  <p:transition spd="med">
+  <p:transition xmlns:p14="http://schemas.microsoft.com/office/powerpoint/2010/main" spd="med">
     <p:newsflash/>
   </p:transition>
 </p:sldLayout>
@@ -2074,7 +2084,7 @@
             <a:fld id="{3BF66540-3958-43A9-8018-4B512397F595}" type="datetimeFigureOut">
               <a:rPr lang="en-US"/>
               <a:pPr/>
-              <a:t>1/30/2013</a:t>
+              <a:t>31/01/13</a:t>
             </a:fld>
             <a:endParaRPr lang="en-US"/>
           </a:p>
@@ -2128,7 +2138,7 @@
             <a:fld id="{AFAE7D39-CAA9-4AC1-AA75-96D3F5EA852F}" type="slidenum">
               <a:rPr lang="en-US"/>
               <a:pPr/>
-              <a:t>‹N°›</a:t>
+              <a:t>‹#›</a:t>
             </a:fld>
             <a:endParaRPr lang="en-US"/>
           </a:p>
@@ -2139,7 +2149,7 @@
   <p:clrMapOvr>
     <a:masterClrMapping/>
   </p:clrMapOvr>
-  <p:transition spd="med">
+  <p:transition xmlns:p14="http://schemas.microsoft.com/office/powerpoint/2010/main" spd="med">
     <p:newsflash/>
   </p:transition>
 </p:sldLayout>
@@ -2340,7 +2350,7 @@
             <a:fld id="{6D3EE326-B164-4A4F-9829-97243102166A}" type="datetimeFigureOut">
               <a:rPr lang="en-US"/>
               <a:pPr/>
-              <a:t>1/30/2013</a:t>
+              <a:t>31/01/13</a:t>
             </a:fld>
             <a:endParaRPr lang="en-US"/>
           </a:p>
@@ -2398,7 +2408,7 @@
             <a:fld id="{C3BC941E-3B8E-4060-A1EF-6CB7ACDB9521}" type="slidenum">
               <a:rPr lang="en-US"/>
               <a:pPr/>
-              <a:t>‹N°›</a:t>
+              <a:t>‹#›</a:t>
             </a:fld>
             <a:endParaRPr lang="en-US"/>
           </a:p>
@@ -2409,7 +2419,7 @@
   <p:clrMapOvr>
     <a:overrideClrMapping bg1="dk1" tx1="lt1" bg2="dk2" tx2="lt2" accent1="accent1" accent2="accent2" accent3="accent3" accent4="accent4" accent5="accent5" accent6="accent6" hlink="hlink" folHlink="folHlink"/>
   </p:clrMapOvr>
-  <p:transition spd="med">
+  <p:transition xmlns:p14="http://schemas.microsoft.com/office/powerpoint/2010/main" spd="med">
     <p:newsflash/>
   </p:transition>
 </p:sldLayout>
@@ -2628,7 +2638,7 @@
             <a:fld id="{175A9C87-D47A-4418-AB09-19695570CFDD}" type="datetimeFigureOut">
               <a:rPr lang="en-US"/>
               <a:pPr/>
-              <a:t>1/30/2013</a:t>
+              <a:t>31/01/13</a:t>
             </a:fld>
             <a:endParaRPr lang="en-US"/>
           </a:p>
@@ -2682,7 +2692,7 @@
             <a:fld id="{5F149E4C-DB7C-4EAB-8380-53089229E982}" type="slidenum">
               <a:rPr lang="en-US"/>
               <a:pPr/>
-              <a:t>‹N°›</a:t>
+              <a:t>‹#›</a:t>
             </a:fld>
             <a:endParaRPr lang="en-US"/>
           </a:p>
@@ -2693,7 +2703,7 @@
   <p:clrMapOvr>
     <a:masterClrMapping/>
   </p:clrMapOvr>
-  <p:transition spd="med">
+  <p:transition xmlns:p14="http://schemas.microsoft.com/office/powerpoint/2010/main" spd="med">
     <p:newsflash/>
   </p:transition>
 </p:sldLayout>
@@ -3026,7 +3036,7 @@
             <a:fld id="{F83D2B49-170F-466A-9FEC-6BD4CF3066F4}" type="datetimeFigureOut">
               <a:rPr lang="en-US"/>
               <a:pPr/>
-              <a:t>1/30/2013</a:t>
+              <a:t>31/01/13</a:t>
             </a:fld>
             <a:endParaRPr lang="en-US"/>
           </a:p>
@@ -3080,7 +3090,7 @@
             <a:fld id="{2D81E788-8B99-47B2-A962-4F70A8426A1E}" type="slidenum">
               <a:rPr lang="en-US"/>
               <a:pPr/>
-              <a:t>‹N°›</a:t>
+              <a:t>‹#›</a:t>
             </a:fld>
             <a:endParaRPr lang="en-US"/>
           </a:p>
@@ -3091,7 +3101,7 @@
   <p:clrMapOvr>
     <a:masterClrMapping/>
   </p:clrMapOvr>
-  <p:transition spd="med">
+  <p:transition xmlns:p14="http://schemas.microsoft.com/office/powerpoint/2010/main" spd="med">
     <p:newsflash/>
   </p:transition>
 </p:sldLayout>
@@ -3196,7 +3206,7 @@
             <a:fld id="{D582C179-A61B-4FA7-B28B-08EC0CA48063}" type="datetimeFigureOut">
               <a:rPr lang="en-US"/>
               <a:pPr/>
-              <a:t>1/30/2013</a:t>
+              <a:t>31/01/13</a:t>
             </a:fld>
             <a:endParaRPr lang="en-US"/>
           </a:p>
@@ -3250,7 +3260,7 @@
             <a:fld id="{088FE702-924A-439B-BC23-588BE5F29100}" type="slidenum">
               <a:rPr lang="en-US"/>
               <a:pPr/>
-              <a:t>‹N°›</a:t>
+              <a:t>‹#›</a:t>
             </a:fld>
             <a:endParaRPr lang="en-US"/>
           </a:p>
@@ -3261,7 +3271,7 @@
   <p:clrMapOvr>
     <a:masterClrMapping/>
   </p:clrMapOvr>
-  <p:transition spd="med">
+  <p:transition xmlns:p14="http://schemas.microsoft.com/office/powerpoint/2010/main" spd="med">
     <p:newsflash/>
   </p:transition>
 </p:sldLayout>
@@ -3306,7 +3316,7 @@
             <a:fld id="{861AE197-3547-4946-B9D6-B5B1982B8D5E}" type="datetimeFigureOut">
               <a:rPr lang="en-US"/>
               <a:pPr/>
-              <a:t>1/30/2013</a:t>
+              <a:t>31/01/13</a:t>
             </a:fld>
             <a:endParaRPr lang="en-US"/>
           </a:p>
@@ -3360,7 +3370,7 @@
             <a:fld id="{841EDCD5-CBA4-4362-BE32-99E8E687F1E4}" type="slidenum">
               <a:rPr lang="en-US"/>
               <a:pPr/>
-              <a:t>‹N°›</a:t>
+              <a:t>‹#›</a:t>
             </a:fld>
             <a:endParaRPr lang="en-US"/>
           </a:p>
@@ -3371,7 +3381,7 @@
   <p:clrMapOvr>
     <a:masterClrMapping/>
   </p:clrMapOvr>
-  <p:transition spd="med">
+  <p:transition xmlns:p14="http://schemas.microsoft.com/office/powerpoint/2010/main" spd="med">
     <p:newsflash/>
   </p:transition>
 </p:sldLayout>
@@ -3587,7 +3597,7 @@
             <a:fld id="{63B32C57-7746-419C-AE2D-4912AD7467C0}" type="datetimeFigureOut">
               <a:rPr lang="en-US"/>
               <a:pPr/>
-              <a:t>1/30/2013</a:t>
+              <a:t>31/01/13</a:t>
             </a:fld>
             <a:endParaRPr lang="en-US"/>
           </a:p>
@@ -3641,7 +3651,7 @@
             <a:fld id="{5BDD0DBA-6DB8-4CE9-9647-2CBC9978C3E3}" type="slidenum">
               <a:rPr lang="en-US"/>
               <a:pPr/>
-              <a:t>‹N°›</a:t>
+              <a:t>‹#›</a:t>
             </a:fld>
             <a:endParaRPr lang="en-US"/>
           </a:p>
@@ -3652,7 +3662,7 @@
   <p:clrMapOvr>
     <a:masterClrMapping/>
   </p:clrMapOvr>
-  <p:transition spd="med">
+  <p:transition xmlns:p14="http://schemas.microsoft.com/office/powerpoint/2010/main" spd="med">
     <p:newsflash/>
   </p:transition>
 </p:sldLayout>
@@ -4243,7 +4253,7 @@
             <a:fld id="{9A2FB173-2AE9-438D-A2F2-F3D57ABDED44}" type="datetimeFigureOut">
               <a:rPr lang="en-US"/>
               <a:pPr/>
-              <a:t>1/30/2013</a:t>
+              <a:t>31/01/13</a:t>
             </a:fld>
             <a:endParaRPr lang="en-US"/>
           </a:p>
@@ -4302,7 +4312,7 @@
             <a:fld id="{93F3B13F-8335-4EFB-A221-FCE3A06A8754}" type="slidenum">
               <a:rPr lang="en-US"/>
               <a:pPr/>
-              <a:t>‹N°›</a:t>
+              <a:t>‹#›</a:t>
             </a:fld>
             <a:endParaRPr lang="en-US"/>
           </a:p>
@@ -4313,7 +4323,7 @@
   <p:clrMapOvr>
     <a:masterClrMapping/>
   </p:clrMapOvr>
-  <p:transition spd="med">
+  <p:transition xmlns:p14="http://schemas.microsoft.com/office/powerpoint/2010/main" spd="med">
     <p:newsflash/>
   </p:transition>
 </p:sldLayout>
@@ -4751,7 +4761,7 @@
             <a:fld id="{D5031E26-2A0E-4854-95F7-5A492F6CE347}" type="datetimeFigureOut">
               <a:rPr lang="en-US"/>
               <a:pPr/>
-              <a:t>1/30/2013</a:t>
+              <a:t>31/01/13</a:t>
             </a:fld>
             <a:endParaRPr lang="en-US"/>
           </a:p>
@@ -4838,7 +4848,7 @@
             <a:fld id="{AB7F9582-8535-4D18-A835-3B5665864C67}" type="slidenum">
               <a:rPr lang="en-US"/>
               <a:pPr/>
-              <a:t>‹N°›</a:t>
+              <a:t>‹#›</a:t>
             </a:fld>
             <a:endParaRPr lang="en-US"/>
           </a:p>
@@ -5118,13 +5128,13 @@
     <p:sldLayoutId id="2147483733" r:id="rId10"/>
     <p:sldLayoutId id="2147483734" r:id="rId11"/>
   </p:sldLayoutIdLst>
-  <p:transition spd="med">
+  <p:transition xmlns:p14="http://schemas.microsoft.com/office/powerpoint/2010/main" spd="med">
     <p:newsflash/>
   </p:transition>
   <p:timing>
     <p:tnLst>
       <p:par>
-        <p:cTn id="1" dur="indefinite" restart="never" nodeType="tmRoot"/>
+        <p:cTn xmlns:p14="http://schemas.microsoft.com/office/powerpoint/2010/main" id="1" dur="indefinite" restart="never" nodeType="tmRoot"/>
       </p:par>
     </p:tnLst>
   </p:timing>
@@ -5775,13 +5785,13 @@
   <p:clrMapOvr>
     <a:masterClrMapping/>
   </p:clrMapOvr>
-  <p:transition spd="med">
+  <p:transition xmlns:p14="http://schemas.microsoft.com/office/powerpoint/2010/main" spd="med">
     <p:newsflash/>
   </p:transition>
   <p:timing>
     <p:tnLst>
       <p:par>
-        <p:cTn id="1" dur="indefinite" restart="never" nodeType="tmRoot">
+        <p:cTn xmlns:p14="http://schemas.microsoft.com/office/powerpoint/2010/main" id="1" dur="indefinite" restart="never" nodeType="tmRoot">
           <p:childTnLst>
             <p:seq concurrent="1" nextAc="seek">
               <p:cTn id="2" dur="indefinite" nodeType="mainSeq">
@@ -6067,17 +6077,7 @@
                 <a:latin typeface="Calibri" pitchFamily="34" charset="0"/>
                 <a:ea typeface="ＭＳ Ｐゴシック" pitchFamily="-84" charset="-128"/>
               </a:rPr>
-              <a:t>Différents </a:t>
-            </a:r>
-            <a:r>
-              <a:rPr lang="fr-FR" sz="2400" b="1" dirty="0" smtClean="0">
-                <a:solidFill>
-                  <a:srgbClr val="004A99"/>
-                </a:solidFill>
-                <a:latin typeface="Calibri" pitchFamily="34" charset="0"/>
-                <a:ea typeface="ＭＳ Ｐゴシック" pitchFamily="-84" charset="-128"/>
-              </a:rPr>
-              <a:t>paramètres</a:t>
+              <a:t>Différents paramètres</a:t>
             </a:r>
           </a:p>
           <a:p>
@@ -6260,13 +6260,13 @@
   <p:clrMapOvr>
     <a:masterClrMapping/>
   </p:clrMapOvr>
-  <p:transition spd="med">
+  <p:transition xmlns:p14="http://schemas.microsoft.com/office/powerpoint/2010/main" spd="med">
     <p:newsflash/>
   </p:transition>
   <p:timing>
     <p:tnLst>
       <p:par>
-        <p:cTn id="1" dur="indefinite" restart="never" nodeType="tmRoot">
+        <p:cTn xmlns:p14="http://schemas.microsoft.com/office/powerpoint/2010/main" id="1" dur="indefinite" restart="never" nodeType="tmRoot">
           <p:childTnLst>
             <p:seq concurrent="1" nextAc="seek">
               <p:cTn id="2" dur="indefinite" nodeType="mainSeq">
@@ -7049,13 +7049,13 @@
   <p:clrMapOvr>
     <a:masterClrMapping/>
   </p:clrMapOvr>
-  <p:transition spd="med">
+  <p:transition xmlns:p14="http://schemas.microsoft.com/office/powerpoint/2010/main" spd="med">
     <p:newsflash/>
   </p:transition>
   <p:timing>
     <p:tnLst>
       <p:par>
-        <p:cTn id="1" dur="indefinite" restart="never" nodeType="tmRoot">
+        <p:cTn xmlns:p14="http://schemas.microsoft.com/office/powerpoint/2010/main" id="1" dur="indefinite" restart="never" nodeType="tmRoot">
           <p:childTnLst>
             <p:seq concurrent="1" nextAc="seek">
               <p:cTn id="2" dur="indefinite" nodeType="mainSeq">
@@ -7613,14 +7613,14 @@
           </a:ln>
           <a:extLst>
             <a:ext uri="{909E8E84-426E-40dd-AFC4-6F175D3DCCD1}">
-              <a14:hiddenFill xmlns:a14="http://schemas.microsoft.com/office/drawing/2010/main" xmlns="">
+              <a14:hiddenFill xmlns:a14="http://schemas.microsoft.com/office/drawing/2010/main">
                 <a:solidFill>
                   <a:srgbClr val="FFFFFF"/>
                 </a:solidFill>
               </a14:hiddenFill>
             </a:ext>
             <a:ext uri="{91240B29-F687-4f45-9708-019B960494DF}">
-              <a14:hiddenLine xmlns:a14="http://schemas.microsoft.com/office/drawing/2010/main" xmlns="" w="9525">
+              <a14:hiddenLine xmlns:a14="http://schemas.microsoft.com/office/drawing/2010/main" w="9525">
                 <a:solidFill>
                   <a:srgbClr val="000000"/>
                 </a:solidFill>
@@ -7630,7 +7630,7 @@
               </a14:hiddenLine>
             </a:ext>
             <a:ext uri="{FAA26D3D-D897-4be2-8F04-BA451C77F1D7}">
-              <ma14:placeholderFlag xmlns:ma14="http://schemas.microsoft.com/office/mac/drawingml/2011/main" xmlns="" val="1"/>
+              <ma14:placeholderFlag xmlns:ma14="http://schemas.microsoft.com/office/mac/drawingml/2011/main" val="1"/>
             </a:ext>
           </a:extLst>
         </p:spPr>
@@ -7980,13 +7980,13 @@
   <p:clrMapOvr>
     <a:masterClrMapping/>
   </p:clrMapOvr>
-  <p:transition spd="med">
+  <p:transition xmlns:p14="http://schemas.microsoft.com/office/powerpoint/2010/main" spd="med">
     <p:newsflash/>
   </p:transition>
   <p:timing>
     <p:tnLst>
       <p:par>
-        <p:cTn id="1" dur="indefinite" restart="never" nodeType="tmRoot">
+        <p:cTn xmlns:p14="http://schemas.microsoft.com/office/powerpoint/2010/main" id="1" dur="indefinite" restart="never" nodeType="tmRoot">
           <p:childTnLst>
             <p:seq concurrent="1" nextAc="seek">
               <p:cTn id="2" dur="indefinite" nodeType="mainSeq">
@@ -8586,14 +8586,14 @@
           </a:ln>
           <a:extLst>
             <a:ext uri="{909E8E84-426E-40dd-AFC4-6F175D3DCCD1}">
-              <a14:hiddenFill xmlns:a14="http://schemas.microsoft.com/office/drawing/2010/main" xmlns="">
+              <a14:hiddenFill xmlns:a14="http://schemas.microsoft.com/office/drawing/2010/main">
                 <a:solidFill>
                   <a:srgbClr val="FFFFFF"/>
                 </a:solidFill>
               </a14:hiddenFill>
             </a:ext>
             <a:ext uri="{91240B29-F687-4f45-9708-019B960494DF}">
-              <a14:hiddenLine xmlns:a14="http://schemas.microsoft.com/office/drawing/2010/main" xmlns="" w="9525">
+              <a14:hiddenLine xmlns:a14="http://schemas.microsoft.com/office/drawing/2010/main" w="9525">
                 <a:solidFill>
                   <a:srgbClr val="000000"/>
                 </a:solidFill>
@@ -8603,7 +8603,7 @@
               </a14:hiddenLine>
             </a:ext>
             <a:ext uri="{FAA26D3D-D897-4be2-8F04-BA451C77F1D7}">
-              <ma14:placeholderFlag xmlns:ma14="http://schemas.microsoft.com/office/mac/drawingml/2011/main" xmlns="" val="1"/>
+              <ma14:placeholderFlag xmlns:ma14="http://schemas.microsoft.com/office/mac/drawingml/2011/main" val="1"/>
             </a:ext>
           </a:extLst>
         </p:spPr>
@@ -9121,13 +9121,13 @@
   <p:clrMapOvr>
     <a:masterClrMapping/>
   </p:clrMapOvr>
-  <p:transition spd="med">
+  <p:transition xmlns:p14="http://schemas.microsoft.com/office/powerpoint/2010/main" spd="med">
     <p:newsflash/>
   </p:transition>
   <p:timing>
     <p:tnLst>
       <p:par>
-        <p:cTn id="1" dur="indefinite" restart="never" nodeType="tmRoot">
+        <p:cTn xmlns:p14="http://schemas.microsoft.com/office/powerpoint/2010/main" id="1" dur="indefinite" restart="never" nodeType="tmRoot">
           <p:childTnLst>
             <p:seq concurrent="1" nextAc="seek">
               <p:cTn id="2" dur="indefinite" nodeType="mainSeq">
@@ -9922,14 +9922,14 @@
           </a:ln>
           <a:extLst>
             <a:ext uri="{909E8E84-426E-40dd-AFC4-6F175D3DCCD1}">
-              <a14:hiddenFill xmlns:a14="http://schemas.microsoft.com/office/drawing/2010/main" xmlns="">
+              <a14:hiddenFill xmlns:a14="http://schemas.microsoft.com/office/drawing/2010/main">
                 <a:solidFill>
                   <a:srgbClr val="FFFFFF"/>
                 </a:solidFill>
               </a14:hiddenFill>
             </a:ext>
             <a:ext uri="{91240B29-F687-4f45-9708-019B960494DF}">
-              <a14:hiddenLine xmlns:a14="http://schemas.microsoft.com/office/drawing/2010/main" xmlns="" w="9525">
+              <a14:hiddenLine xmlns:a14="http://schemas.microsoft.com/office/drawing/2010/main" w="9525">
                 <a:solidFill>
                   <a:srgbClr val="000000"/>
                 </a:solidFill>
@@ -9939,7 +9939,7 @@
               </a14:hiddenLine>
             </a:ext>
             <a:ext uri="{FAA26D3D-D897-4be2-8F04-BA451C77F1D7}">
-              <ma14:placeholderFlag xmlns:ma14="http://schemas.microsoft.com/office/mac/drawingml/2011/main" xmlns="" val="1"/>
+              <ma14:placeholderFlag xmlns:ma14="http://schemas.microsoft.com/office/mac/drawingml/2011/main" val="1"/>
             </a:ext>
           </a:extLst>
         </p:spPr>
@@ -10197,17 +10197,7 @@
                 <a:latin typeface="Calibri" charset="0"/>
                 <a:cs typeface="Calibri" charset="0"/>
               </a:rPr>
-              <a:t>													</a:t>
-            </a:r>
-            <a:r>
-              <a:rPr lang="fr-FR" sz="1800" b="1" dirty="0" smtClean="0">
-                <a:solidFill>
-                  <a:srgbClr val="00B050"/>
-                </a:solidFill>
-                <a:latin typeface="Calibri" charset="0"/>
-                <a:cs typeface="Calibri" charset="0"/>
-              </a:rPr>
-              <a:t>						</a:t>
+              <a:t>																			</a:t>
             </a:r>
             <a:endParaRPr lang="fr-FR" sz="2200" b="1" dirty="0" smtClean="0">
               <a:solidFill>
@@ -10304,17 +10294,7 @@
                 <a:latin typeface="Calibri" charset="0"/>
                 <a:cs typeface="Calibri" charset="0"/>
               </a:rPr>
-              <a:t>				Protocole </a:t>
-            </a:r>
-            <a:r>
-              <a:rPr lang="fr-FR" sz="2200" b="1" dirty="0" smtClean="0">
-                <a:solidFill>
-                  <a:srgbClr val="004A99"/>
-                </a:solidFill>
-                <a:latin typeface="Calibri" charset="0"/>
-                <a:cs typeface="Calibri" charset="0"/>
-              </a:rPr>
-              <a:t>d’arrêt</a:t>
+              <a:t>				Protocole d’arrêt</a:t>
             </a:r>
           </a:p>
           <a:p>
@@ -10333,27 +10313,7 @@
                 <a:latin typeface="Calibri" charset="0"/>
                 <a:cs typeface="Calibri" charset="0"/>
               </a:rPr>
-              <a:t>	</a:t>
-            </a:r>
-            <a:r>
-              <a:rPr lang="fr-FR" sz="2200" b="1" dirty="0" smtClean="0">
-                <a:solidFill>
-                  <a:srgbClr val="004A99"/>
-                </a:solidFill>
-                <a:latin typeface="Calibri" charset="0"/>
-                <a:cs typeface="Calibri" charset="0"/>
-              </a:rPr>
-              <a:t>				Différents </a:t>
-            </a:r>
-            <a:r>
-              <a:rPr lang="fr-FR" sz="2200" b="1" dirty="0" smtClean="0">
-                <a:solidFill>
-                  <a:srgbClr val="004A99"/>
-                </a:solidFill>
-                <a:latin typeface="Calibri" charset="0"/>
-                <a:cs typeface="Calibri" charset="0"/>
-              </a:rPr>
-              <a:t>capteurs</a:t>
+              <a:t>					Différents capteurs</a:t>
             </a:r>
           </a:p>
           <a:p>
@@ -10665,13 +10625,13 @@
   <p:clrMapOvr>
     <a:masterClrMapping/>
   </p:clrMapOvr>
-  <p:transition spd="med">
+  <p:transition xmlns:p14="http://schemas.microsoft.com/office/powerpoint/2010/main" spd="med">
     <p:newsflash/>
   </p:transition>
   <p:timing>
     <p:tnLst>
       <p:par>
-        <p:cTn id="1" dur="indefinite" restart="never" nodeType="tmRoot">
+        <p:cTn xmlns:p14="http://schemas.microsoft.com/office/powerpoint/2010/main" id="1" dur="indefinite" restart="never" nodeType="tmRoot">
           <p:childTnLst>
             <p:seq concurrent="1" nextAc="seek">
               <p:cTn id="2" dur="indefinite" nodeType="mainSeq">
@@ -11290,14 +11250,14 @@
           </a:ln>
           <a:extLst>
             <a:ext uri="{909E8E84-426E-40dd-AFC4-6F175D3DCCD1}">
-              <a14:hiddenFill xmlns:a14="http://schemas.microsoft.com/office/drawing/2010/main" xmlns="">
+              <a14:hiddenFill xmlns:a14="http://schemas.microsoft.com/office/drawing/2010/main">
                 <a:solidFill>
                   <a:srgbClr val="FFFFFF"/>
                 </a:solidFill>
               </a14:hiddenFill>
             </a:ext>
             <a:ext uri="{91240B29-F687-4f45-9708-019B960494DF}">
-              <a14:hiddenLine xmlns:a14="http://schemas.microsoft.com/office/drawing/2010/main" xmlns="" w="9525">
+              <a14:hiddenLine xmlns:a14="http://schemas.microsoft.com/office/drawing/2010/main" w="9525">
                 <a:solidFill>
                   <a:srgbClr val="000000"/>
                 </a:solidFill>
@@ -11307,7 +11267,7 @@
               </a14:hiddenLine>
             </a:ext>
             <a:ext uri="{FAA26D3D-D897-4be2-8F04-BA451C77F1D7}">
-              <ma14:placeholderFlag xmlns:ma14="http://schemas.microsoft.com/office/mac/drawingml/2011/main" xmlns="" val="1"/>
+              <ma14:placeholderFlag xmlns:ma14="http://schemas.microsoft.com/office/mac/drawingml/2011/main" val="1"/>
             </a:ext>
           </a:extLst>
         </p:spPr>
@@ -11782,13 +11742,13 @@
   <p:clrMapOvr>
     <a:masterClrMapping/>
   </p:clrMapOvr>
-  <p:transition spd="med">
+  <p:transition xmlns:p14="http://schemas.microsoft.com/office/powerpoint/2010/main" spd="med">
     <p:newsflash/>
   </p:transition>
   <p:timing>
     <p:tnLst>
       <p:par>
-        <p:cTn id="1" dur="indefinite" restart="never" nodeType="tmRoot">
+        <p:cTn xmlns:p14="http://schemas.microsoft.com/office/powerpoint/2010/main" id="1" dur="indefinite" restart="never" nodeType="tmRoot">
           <p:childTnLst>
             <p:seq concurrent="1" nextAc="seek">
               <p:cTn id="2" dur="indefinite" nodeType="mainSeq">
@@ -12285,14 +12245,14 @@
           </a:ln>
           <a:extLst>
             <a:ext uri="{909E8E84-426E-40dd-AFC4-6F175D3DCCD1}">
-              <a14:hiddenFill xmlns:a14="http://schemas.microsoft.com/office/drawing/2010/main" xmlns="">
+              <a14:hiddenFill xmlns:a14="http://schemas.microsoft.com/office/drawing/2010/main">
                 <a:solidFill>
                   <a:srgbClr val="FFFFFF"/>
                 </a:solidFill>
               </a14:hiddenFill>
             </a:ext>
             <a:ext uri="{91240B29-F687-4f45-9708-019B960494DF}">
-              <a14:hiddenLine xmlns:a14="http://schemas.microsoft.com/office/drawing/2010/main" xmlns="" w="9525">
+              <a14:hiddenLine xmlns:a14="http://schemas.microsoft.com/office/drawing/2010/main" w="9525">
                 <a:solidFill>
                   <a:srgbClr val="000000"/>
                 </a:solidFill>
@@ -12302,7 +12262,7 @@
               </a14:hiddenLine>
             </a:ext>
             <a:ext uri="{FAA26D3D-D897-4be2-8F04-BA451C77F1D7}">
-              <ma14:placeholderFlag xmlns:ma14="http://schemas.microsoft.com/office/mac/drawingml/2011/main" xmlns="" val="1"/>
+              <ma14:placeholderFlag xmlns:ma14="http://schemas.microsoft.com/office/mac/drawingml/2011/main" val="1"/>
             </a:ext>
           </a:extLst>
         </p:spPr>
@@ -12871,13 +12831,13 @@
   <p:clrMapOvr>
     <a:masterClrMapping/>
   </p:clrMapOvr>
-  <p:transition spd="med">
+  <p:transition xmlns:p14="http://schemas.microsoft.com/office/powerpoint/2010/main" spd="med">
     <p:newsflash/>
   </p:transition>
   <p:timing>
     <p:tnLst>
       <p:par>
-        <p:cTn id="1" dur="indefinite" restart="never" nodeType="tmRoot">
+        <p:cTn xmlns:p14="http://schemas.microsoft.com/office/powerpoint/2010/main" id="1" dur="indefinite" restart="never" nodeType="tmRoot">
           <p:childTnLst>
             <p:seq concurrent="1" nextAc="seek">
               <p:cTn id="2" dur="indefinite" nodeType="mainSeq">
@@ -13374,14 +13334,14 @@
           </a:ln>
           <a:extLst>
             <a:ext uri="{909E8E84-426E-40dd-AFC4-6F175D3DCCD1}">
-              <a14:hiddenFill xmlns:a14="http://schemas.microsoft.com/office/drawing/2010/main" xmlns="">
+              <a14:hiddenFill xmlns:a14="http://schemas.microsoft.com/office/drawing/2010/main">
                 <a:solidFill>
                   <a:srgbClr val="FFFFFF"/>
                 </a:solidFill>
               </a14:hiddenFill>
             </a:ext>
             <a:ext uri="{91240B29-F687-4f45-9708-019B960494DF}">
-              <a14:hiddenLine xmlns:a14="http://schemas.microsoft.com/office/drawing/2010/main" xmlns="" w="9525">
+              <a14:hiddenLine xmlns:a14="http://schemas.microsoft.com/office/drawing/2010/main" w="9525">
                 <a:solidFill>
                   <a:srgbClr val="000000"/>
                 </a:solidFill>
@@ -13391,7 +13351,7 @@
               </a14:hiddenLine>
             </a:ext>
             <a:ext uri="{FAA26D3D-D897-4be2-8F04-BA451C77F1D7}">
-              <ma14:placeholderFlag xmlns:ma14="http://schemas.microsoft.com/office/mac/drawingml/2011/main" xmlns="" val="1"/>
+              <ma14:placeholderFlag xmlns:ma14="http://schemas.microsoft.com/office/mac/drawingml/2011/main" val="1"/>
             </a:ext>
           </a:extLst>
         </p:spPr>
@@ -13659,25 +13619,8 @@
                 <a:latin typeface="Calibri" charset="0"/>
                 <a:cs typeface="Calibri" charset="0"/>
               </a:rPr>
-              <a:t>						</a:t>
-            </a:r>
-            <a:r>
-              <a:rPr lang="fr-FR" sz="2200" b="1" dirty="0" smtClean="0">
-                <a:solidFill>
-                  <a:srgbClr val="004A99"/>
-                </a:solidFill>
-                <a:latin typeface="Calibri" charset="0"/>
-                <a:cs typeface="Calibri" charset="0"/>
-              </a:rPr>
-              <a:t>Contrôle manuel</a:t>
-            </a:r>
-            <a:endParaRPr lang="fr-FR" sz="2200" b="1" dirty="0" smtClean="0">
-              <a:solidFill>
-                <a:srgbClr val="004A99"/>
-              </a:solidFill>
-              <a:latin typeface="Calibri" charset="0"/>
-              <a:cs typeface="Calibri" charset="0"/>
-            </a:endParaRPr>
+              <a:t>						Contrôle manuel</a:t>
+            </a:r>
           </a:p>
           <a:p>
             <a:pPr marL="2286000" lvl="8" indent="0" defTabSz="457200">
@@ -13706,27 +13649,7 @@
                 <a:latin typeface="Calibri" charset="0"/>
                 <a:cs typeface="Calibri" charset="0"/>
               </a:rPr>
-              <a:t>						</a:t>
-            </a:r>
-            <a:r>
-              <a:rPr lang="fr-FR" sz="2200" b="1" dirty="0" smtClean="0">
-                <a:solidFill>
-                  <a:srgbClr val="004A99"/>
-                </a:solidFill>
-                <a:latin typeface="Calibri" charset="0"/>
-                <a:cs typeface="Calibri" charset="0"/>
-              </a:rPr>
-              <a:t>Différents </a:t>
-            </a:r>
-            <a:r>
-              <a:rPr lang="fr-FR" sz="2200" b="1" dirty="0" smtClean="0">
-                <a:solidFill>
-                  <a:srgbClr val="004A99"/>
-                </a:solidFill>
-                <a:latin typeface="Calibri" charset="0"/>
-                <a:cs typeface="Calibri" charset="0"/>
-              </a:rPr>
-              <a:t>appareillages							Différents tests.</a:t>
+              <a:t>						Différents appareillages							Différents tests.</a:t>
             </a:r>
             <a:r>
               <a:rPr lang="fr-FR" sz="2200" b="1" dirty="0">
@@ -13949,13 +13872,13 @@
   <p:clrMapOvr>
     <a:masterClrMapping/>
   </p:clrMapOvr>
-  <p:transition spd="med">
+  <p:transition xmlns:p14="http://schemas.microsoft.com/office/powerpoint/2010/main" spd="med">
     <p:newsflash/>
   </p:transition>
   <p:timing>
     <p:tnLst>
       <p:par>
-        <p:cTn id="1" dur="indefinite" restart="never" nodeType="tmRoot">
+        <p:cTn xmlns:p14="http://schemas.microsoft.com/office/powerpoint/2010/main" id="1" dur="indefinite" restart="never" nodeType="tmRoot">
           <p:childTnLst>
             <p:seq concurrent="1" nextAc="seek">
               <p:cTn id="2" dur="indefinite" nodeType="mainSeq">
@@ -14513,14 +14436,14 @@
           </a:ln>
           <a:extLst>
             <a:ext uri="{909E8E84-426E-40dd-AFC4-6F175D3DCCD1}">
-              <a14:hiddenFill xmlns:a14="http://schemas.microsoft.com/office/drawing/2010/main" xmlns="">
+              <a14:hiddenFill xmlns:a14="http://schemas.microsoft.com/office/drawing/2010/main">
                 <a:solidFill>
                   <a:srgbClr val="FFFFFF"/>
                 </a:solidFill>
               </a14:hiddenFill>
             </a:ext>
             <a:ext uri="{91240B29-F687-4f45-9708-019B960494DF}">
-              <a14:hiddenLine xmlns:a14="http://schemas.microsoft.com/office/drawing/2010/main" xmlns="" w="9525">
+              <a14:hiddenLine xmlns:a14="http://schemas.microsoft.com/office/drawing/2010/main" w="9525">
                 <a:solidFill>
                   <a:srgbClr val="000000"/>
                 </a:solidFill>
@@ -14530,7 +14453,7 @@
               </a14:hiddenLine>
             </a:ext>
             <a:ext uri="{FAA26D3D-D897-4be2-8F04-BA451C77F1D7}">
-              <ma14:placeholderFlag xmlns:ma14="http://schemas.microsoft.com/office/mac/drawingml/2011/main" xmlns="" val="1"/>
+              <ma14:placeholderFlag xmlns:ma14="http://schemas.microsoft.com/office/mac/drawingml/2011/main" val="1"/>
             </a:ext>
           </a:extLst>
         </p:spPr>
@@ -15138,13 +15061,13 @@
   <p:clrMapOvr>
     <a:masterClrMapping/>
   </p:clrMapOvr>
-  <p:transition spd="med">
+  <p:transition xmlns:p14="http://schemas.microsoft.com/office/powerpoint/2010/main" spd="med">
     <p:newsflash/>
   </p:transition>
   <p:timing>
     <p:tnLst>
       <p:par>
-        <p:cTn id="1" dur="indefinite" restart="never" nodeType="tmRoot">
+        <p:cTn xmlns:p14="http://schemas.microsoft.com/office/powerpoint/2010/main" id="1" dur="indefinite" restart="never" nodeType="tmRoot">
           <p:childTnLst>
             <p:seq concurrent="1" nextAc="seek">
               <p:cTn id="2" dur="indefinite" nodeType="mainSeq">
@@ -15866,14 +15789,14 @@
           </a:ln>
           <a:extLst>
             <a:ext uri="{909E8E84-426E-40dd-AFC4-6F175D3DCCD1}">
-              <a14:hiddenFill xmlns:a14="http://schemas.microsoft.com/office/drawing/2010/main" xmlns="">
+              <a14:hiddenFill xmlns:a14="http://schemas.microsoft.com/office/drawing/2010/main">
                 <a:solidFill>
                   <a:srgbClr val="FFFFFF"/>
                 </a:solidFill>
               </a14:hiddenFill>
             </a:ext>
             <a:ext uri="{91240B29-F687-4f45-9708-019B960494DF}">
-              <a14:hiddenLine xmlns:a14="http://schemas.microsoft.com/office/drawing/2010/main" xmlns="" w="9525">
+              <a14:hiddenLine xmlns:a14="http://schemas.microsoft.com/office/drawing/2010/main" w="9525">
                 <a:solidFill>
                   <a:srgbClr val="000000"/>
                 </a:solidFill>
@@ -15883,7 +15806,7 @@
               </a14:hiddenLine>
             </a:ext>
             <a:ext uri="{FAA26D3D-D897-4be2-8F04-BA451C77F1D7}">
-              <ma14:placeholderFlag xmlns:ma14="http://schemas.microsoft.com/office/mac/drawingml/2011/main" xmlns="" val="1"/>
+              <ma14:placeholderFlag xmlns:ma14="http://schemas.microsoft.com/office/mac/drawingml/2011/main" val="1"/>
             </a:ext>
           </a:extLst>
         </p:spPr>
@@ -16157,17 +16080,7 @@
                 <a:latin typeface="Calibri" charset="0"/>
                 <a:cs typeface="Calibri" charset="0"/>
               </a:rPr>
-              <a:t>	</a:t>
-            </a:r>
-            <a:r>
-              <a:rPr lang="fr-FR" sz="1000" b="1" dirty="0" smtClean="0">
-                <a:solidFill>
-                  <a:srgbClr val="00B050"/>
-                </a:solidFill>
-                <a:latin typeface="Calibri" charset="0"/>
-                <a:cs typeface="Calibri" charset="0"/>
-              </a:rPr>
-              <a:t>					</a:t>
+              <a:t>						</a:t>
             </a:r>
             <a:r>
               <a:rPr lang="fr-FR" sz="1000" b="1" dirty="0">
@@ -16443,13 +16356,13 @@
   <p:clrMapOvr>
     <a:masterClrMapping/>
   </p:clrMapOvr>
-  <p:transition spd="med">
+  <p:transition xmlns:p14="http://schemas.microsoft.com/office/powerpoint/2010/main" spd="med">
     <p:newsflash/>
   </p:transition>
   <p:timing>
     <p:tnLst>
       <p:par>
-        <p:cTn id="1" dur="indefinite" restart="never" nodeType="tmRoot">
+        <p:cTn xmlns:p14="http://schemas.microsoft.com/office/powerpoint/2010/main" id="1" dur="indefinite" restart="never" nodeType="tmRoot">
           <p:childTnLst>
             <p:seq concurrent="1" nextAc="seek">
               <p:cTn id="2" dur="indefinite" nodeType="mainSeq">
@@ -17067,27 +16980,7 @@
                 <a:latin typeface="Calibri" pitchFamily="34" charset="0"/>
                 <a:ea typeface="ＭＳ Ｐゴシック" pitchFamily="-84" charset="-128"/>
               </a:rPr>
-              <a:t>	           </a:t>
-            </a:r>
-            <a:r>
-              <a:rPr lang="fr-FR" sz="1200" b="1" dirty="0" smtClean="0">
-                <a:solidFill>
-                  <a:srgbClr val="55A839"/>
-                </a:solidFill>
-                <a:latin typeface="Calibri" pitchFamily="34" charset="0"/>
-                <a:ea typeface="ＭＳ Ｐゴシック" pitchFamily="-84" charset="-128"/>
-              </a:rPr>
-              <a:t> Présentation </a:t>
-            </a:r>
-            <a:r>
-              <a:rPr lang="fr-FR" sz="1200" b="1" dirty="0" smtClean="0">
-                <a:solidFill>
-                  <a:srgbClr val="55A839"/>
-                </a:solidFill>
-                <a:latin typeface="Calibri" pitchFamily="34" charset="0"/>
-                <a:ea typeface="ＭＳ Ｐゴシック" pitchFamily="-84" charset="-128"/>
-              </a:rPr>
-              <a:t>du projet</a:t>
+              <a:t>	            Présentation du projet</a:t>
             </a:r>
           </a:p>
           <a:p>
@@ -17919,13 +17812,13 @@
   <p:clrMapOvr>
     <a:masterClrMapping/>
   </p:clrMapOvr>
-  <p:transition spd="med">
+  <p:transition xmlns:p14="http://schemas.microsoft.com/office/powerpoint/2010/main" spd="med">
     <p:newsflash/>
   </p:transition>
   <p:timing>
     <p:tnLst>
       <p:par>
-        <p:cTn id="1" dur="indefinite" restart="never" nodeType="tmRoot">
+        <p:cTn xmlns:p14="http://schemas.microsoft.com/office/powerpoint/2010/main" id="1" dur="indefinite" restart="never" nodeType="tmRoot">
           <p:childTnLst>
             <p:seq concurrent="1" nextAc="seek">
               <p:cTn id="2" dur="indefinite" nodeType="mainSeq">
@@ -19968,14 +19861,14 @@
           </a:ln>
           <a:extLst>
             <a:ext uri="{909E8E84-426E-40dd-AFC4-6F175D3DCCD1}">
-              <a14:hiddenFill xmlns:a14="http://schemas.microsoft.com/office/drawing/2010/main" xmlns="">
+              <a14:hiddenFill xmlns:a14="http://schemas.microsoft.com/office/drawing/2010/main">
                 <a:solidFill>
                   <a:srgbClr val="FFFFFF"/>
                 </a:solidFill>
               </a14:hiddenFill>
             </a:ext>
             <a:ext uri="{91240B29-F687-4f45-9708-019B960494DF}">
-              <a14:hiddenLine xmlns:a14="http://schemas.microsoft.com/office/drawing/2010/main" xmlns="" w="9525">
+              <a14:hiddenLine xmlns:a14="http://schemas.microsoft.com/office/drawing/2010/main" w="9525">
                 <a:solidFill>
                   <a:srgbClr val="000000"/>
                 </a:solidFill>
@@ -19985,7 +19878,7 @@
               </a14:hiddenLine>
             </a:ext>
             <a:ext uri="{FAA26D3D-D897-4be2-8F04-BA451C77F1D7}">
-              <ma14:placeholderFlag xmlns:ma14="http://schemas.microsoft.com/office/mac/drawingml/2011/main" xmlns="" val="1"/>
+              <ma14:placeholderFlag xmlns:ma14="http://schemas.microsoft.com/office/mac/drawingml/2011/main" val="1"/>
             </a:ext>
           </a:extLst>
         </p:spPr>
@@ -20547,13 +20440,13 @@
   <p:clrMapOvr>
     <a:masterClrMapping/>
   </p:clrMapOvr>
-  <p:transition spd="med">
+  <p:transition xmlns:p14="http://schemas.microsoft.com/office/powerpoint/2010/main" spd="med">
     <p:newsflash/>
   </p:transition>
   <p:timing>
     <p:tnLst>
       <p:par>
-        <p:cTn id="1" dur="indefinite" restart="never" nodeType="tmRoot">
+        <p:cTn xmlns:p14="http://schemas.microsoft.com/office/powerpoint/2010/main" id="1" dur="indefinite" restart="never" nodeType="tmRoot">
           <p:childTnLst>
             <p:seq concurrent="1" nextAc="seek">
               <p:cTn id="2" dur="indefinite" nodeType="mainSeq">
@@ -21092,14 +20985,14 @@
           </a:ln>
           <a:extLst>
             <a:ext uri="{909E8E84-426E-40dd-AFC4-6F175D3DCCD1}">
-              <a14:hiddenFill xmlns:a14="http://schemas.microsoft.com/office/drawing/2010/main" xmlns="">
+              <a14:hiddenFill xmlns:a14="http://schemas.microsoft.com/office/drawing/2010/main">
                 <a:solidFill>
                   <a:srgbClr val="FFFFFF"/>
                 </a:solidFill>
               </a14:hiddenFill>
             </a:ext>
             <a:ext uri="{91240B29-F687-4f45-9708-019B960494DF}">
-              <a14:hiddenLine xmlns:a14="http://schemas.microsoft.com/office/drawing/2010/main" xmlns="" w="9525">
+              <a14:hiddenLine xmlns:a14="http://schemas.microsoft.com/office/drawing/2010/main" w="9525">
                 <a:solidFill>
                   <a:srgbClr val="000000"/>
                 </a:solidFill>
@@ -21109,7 +21002,7 @@
               </a14:hiddenLine>
             </a:ext>
             <a:ext uri="{FAA26D3D-D897-4be2-8F04-BA451C77F1D7}">
-              <ma14:placeholderFlag xmlns:ma14="http://schemas.microsoft.com/office/mac/drawingml/2011/main" xmlns="" val="1"/>
+              <ma14:placeholderFlag xmlns:ma14="http://schemas.microsoft.com/office/mac/drawingml/2011/main" val="1"/>
             </a:ext>
           </a:extLst>
         </p:spPr>
@@ -21368,13 +21261,6 @@
               </a:rPr>
               <a:t>								Statut</a:t>
             </a:r>
-            <a:endParaRPr lang="fr-FR" sz="2200" b="1" dirty="0" smtClean="0">
-              <a:solidFill>
-                <a:srgbClr val="004A99"/>
-              </a:solidFill>
-              <a:latin typeface="Calibri" charset="0"/>
-              <a:cs typeface="Calibri" charset="0"/>
-            </a:endParaRPr>
           </a:p>
           <a:p>
             <a:pPr marL="2286000" lvl="8" indent="0" defTabSz="457200">
@@ -21490,17 +21376,7 @@
                 <a:latin typeface="Calibri" charset="0"/>
                 <a:cs typeface="Calibri" charset="0"/>
               </a:rPr>
-              <a:t>						Niveau </a:t>
-            </a:r>
-            <a:r>
-              <a:rPr lang="fr-FR" sz="2200" b="1" dirty="0" smtClean="0">
-                <a:solidFill>
-                  <a:srgbClr val="004A99"/>
-                </a:solidFill>
-                <a:latin typeface="Calibri" charset="0"/>
-                <a:cs typeface="Calibri" charset="0"/>
-              </a:rPr>
-              <a:t>gravité</a:t>
+              <a:t>						Niveau gravité</a:t>
             </a:r>
           </a:p>
           <a:p>
@@ -21519,17 +21395,7 @@
                 <a:latin typeface="Calibri" charset="0"/>
                 <a:cs typeface="Calibri" charset="0"/>
               </a:rPr>
-              <a:t>	</a:t>
-            </a:r>
-            <a:r>
-              <a:rPr lang="fr-FR" sz="2200" b="1" dirty="0" smtClean="0">
-                <a:solidFill>
-                  <a:srgbClr val="004A99"/>
-                </a:solidFill>
-                <a:latin typeface="Calibri" charset="0"/>
-                <a:cs typeface="Calibri" charset="0"/>
-              </a:rPr>
-              <a:t>						</a:t>
+              <a:t>							</a:t>
             </a:r>
             <a:r>
               <a:rPr lang="fr-FR" sz="1800" b="1" dirty="0" smtClean="0">
@@ -21762,13 +21628,13 @@
   <p:clrMapOvr>
     <a:masterClrMapping/>
   </p:clrMapOvr>
-  <p:transition spd="med">
+  <p:transition xmlns:p14="http://schemas.microsoft.com/office/powerpoint/2010/main" spd="med">
     <p:newsflash/>
   </p:transition>
   <p:timing>
     <p:tnLst>
       <p:par>
-        <p:cTn id="1" dur="indefinite" restart="never" nodeType="tmRoot">
+        <p:cTn xmlns:p14="http://schemas.microsoft.com/office/powerpoint/2010/main" id="1" dur="indefinite" restart="never" nodeType="tmRoot">
           <p:childTnLst>
             <p:seq concurrent="1" nextAc="seek">
               <p:cTn id="2" dur="indefinite" nodeType="mainSeq">
@@ -22551,14 +22417,14 @@
           </a:ln>
           <a:extLst>
             <a:ext uri="{909E8E84-426E-40dd-AFC4-6F175D3DCCD1}">
-              <a14:hiddenFill xmlns:a14="http://schemas.microsoft.com/office/drawing/2010/main" xmlns="">
+              <a14:hiddenFill xmlns:a14="http://schemas.microsoft.com/office/drawing/2010/main">
                 <a:solidFill>
                   <a:srgbClr val="FFFFFF"/>
                 </a:solidFill>
               </a14:hiddenFill>
             </a:ext>
             <a:ext uri="{91240B29-F687-4f45-9708-019B960494DF}">
-              <a14:hiddenLine xmlns:a14="http://schemas.microsoft.com/office/drawing/2010/main" xmlns="" w="9525">
+              <a14:hiddenLine xmlns:a14="http://schemas.microsoft.com/office/drawing/2010/main" w="9525">
                 <a:solidFill>
                   <a:srgbClr val="000000"/>
                 </a:solidFill>
@@ -22568,7 +22434,7 @@
               </a14:hiddenLine>
             </a:ext>
             <a:ext uri="{FAA26D3D-D897-4be2-8F04-BA451C77F1D7}">
-              <ma14:placeholderFlag xmlns:ma14="http://schemas.microsoft.com/office/mac/drawingml/2011/main" xmlns="" val="1"/>
+              <ma14:placeholderFlag xmlns:ma14="http://schemas.microsoft.com/office/mac/drawingml/2011/main" val="1"/>
             </a:ext>
           </a:extLst>
         </p:spPr>
@@ -22904,13 +22770,13 @@
   <p:clrMapOvr>
     <a:masterClrMapping/>
   </p:clrMapOvr>
-  <p:transition spd="med">
+  <p:transition xmlns:p14="http://schemas.microsoft.com/office/powerpoint/2010/main" spd="med">
     <p:newsflash/>
   </p:transition>
   <p:timing>
     <p:tnLst>
       <p:par>
-        <p:cTn id="1" dur="indefinite" restart="never" nodeType="tmRoot">
+        <p:cTn xmlns:p14="http://schemas.microsoft.com/office/powerpoint/2010/main" id="1" dur="indefinite" restart="never" nodeType="tmRoot">
           <p:childTnLst>
             <p:seq concurrent="1" nextAc="seek">
               <p:cTn id="2" dur="indefinite" nodeType="mainSeq">
@@ -23415,14 +23281,14 @@
           </a:ln>
           <a:extLst>
             <a:ext uri="{909E8E84-426E-40dd-AFC4-6F175D3DCCD1}">
-              <a14:hiddenFill xmlns:a14="http://schemas.microsoft.com/office/drawing/2010/main" xmlns="">
+              <a14:hiddenFill xmlns:a14="http://schemas.microsoft.com/office/drawing/2010/main">
                 <a:solidFill>
                   <a:srgbClr val="FFFFFF"/>
                 </a:solidFill>
               </a14:hiddenFill>
             </a:ext>
             <a:ext uri="{91240B29-F687-4f45-9708-019B960494DF}">
-              <a14:hiddenLine xmlns:a14="http://schemas.microsoft.com/office/drawing/2010/main" xmlns="" w="9525">
+              <a14:hiddenLine xmlns:a14="http://schemas.microsoft.com/office/drawing/2010/main" w="9525">
                 <a:solidFill>
                   <a:srgbClr val="000000"/>
                 </a:solidFill>
@@ -23432,7 +23298,7 @@
               </a14:hiddenLine>
             </a:ext>
             <a:ext uri="{FAA26D3D-D897-4be2-8F04-BA451C77F1D7}">
-              <ma14:placeholderFlag xmlns:ma14="http://schemas.microsoft.com/office/mac/drawingml/2011/main" xmlns="" val="1"/>
+              <ma14:placeholderFlag xmlns:ma14="http://schemas.microsoft.com/office/mac/drawingml/2011/main" val="1"/>
             </a:ext>
           </a:extLst>
         </p:spPr>
@@ -23841,13 +23707,13 @@
   <p:clrMapOvr>
     <a:masterClrMapping/>
   </p:clrMapOvr>
-  <p:transition spd="med">
+  <p:transition xmlns:p14="http://schemas.microsoft.com/office/powerpoint/2010/main" spd="med">
     <p:newsflash/>
   </p:transition>
   <p:timing>
     <p:tnLst>
       <p:par>
-        <p:cTn id="1" dur="indefinite" restart="never" nodeType="tmRoot">
+        <p:cTn xmlns:p14="http://schemas.microsoft.com/office/powerpoint/2010/main" id="1" dur="indefinite" restart="never" nodeType="tmRoot">
           <p:childTnLst>
             <p:seq concurrent="1" nextAc="seek">
               <p:cTn id="2" dur="indefinite" nodeType="mainSeq">
@@ -24577,13 +24443,13 @@
   <p:clrMapOvr>
     <a:masterClrMapping/>
   </p:clrMapOvr>
-  <p:transition spd="med">
+  <p:transition xmlns:p14="http://schemas.microsoft.com/office/powerpoint/2010/main" spd="med">
     <p:newsflash/>
   </p:transition>
   <p:timing>
     <p:tnLst>
       <p:par>
-        <p:cTn id="1" dur="indefinite" restart="never" nodeType="tmRoot">
+        <p:cTn xmlns:p14="http://schemas.microsoft.com/office/powerpoint/2010/main" id="1" dur="indefinite" restart="never" nodeType="tmRoot">
           <p:childTnLst>
             <p:seq concurrent="1" nextAc="seek">
               <p:cTn id="2" dur="indefinite" nodeType="mainSeq">
@@ -24981,13 +24847,13 @@
   <p:clrMapOvr>
     <a:masterClrMapping/>
   </p:clrMapOvr>
-  <p:transition spd="med">
+  <p:transition xmlns:p14="http://schemas.microsoft.com/office/powerpoint/2010/main" spd="med">
     <p:newsflash/>
   </p:transition>
   <p:timing>
     <p:tnLst>
       <p:par>
-        <p:cTn id="1" dur="indefinite" restart="never" nodeType="tmRoot">
+        <p:cTn xmlns:p14="http://schemas.microsoft.com/office/powerpoint/2010/main" id="1" dur="indefinite" restart="never" nodeType="tmRoot">
           <p:childTnLst>
             <p:seq concurrent="1" nextAc="seek">
               <p:cTn id="2" dur="indefinite" nodeType="mainSeq">
@@ -25313,13 +25179,13 @@
   <p:clrMapOvr>
     <a:masterClrMapping/>
   </p:clrMapOvr>
-  <p:transition spd="med">
+  <p:transition xmlns:p14="http://schemas.microsoft.com/office/powerpoint/2010/main" spd="med">
     <p:newsflash/>
   </p:transition>
   <p:timing>
     <p:tnLst>
       <p:par>
-        <p:cTn id="1" dur="indefinite" restart="never" nodeType="tmRoot">
+        <p:cTn xmlns:p14="http://schemas.microsoft.com/office/powerpoint/2010/main" id="1" dur="indefinite" restart="never" nodeType="tmRoot">
           <p:childTnLst>
             <p:seq concurrent="1" nextAc="seek">
               <p:cTn id="2" dur="indefinite" nodeType="mainSeq">
@@ -25814,13 +25680,13 @@
   <p:clrMapOvr>
     <a:masterClrMapping/>
   </p:clrMapOvr>
-  <p:transition spd="med">
+  <p:transition xmlns:p14="http://schemas.microsoft.com/office/powerpoint/2010/main" spd="med">
     <p:newsflash/>
   </p:transition>
   <p:timing>
     <p:tnLst>
       <p:par>
-        <p:cTn id="1" dur="indefinite" restart="never" nodeType="tmRoot">
+        <p:cTn xmlns:p14="http://schemas.microsoft.com/office/powerpoint/2010/main" id="1" dur="indefinite" restart="never" nodeType="tmRoot">
           <p:childTnLst>
             <p:seq concurrent="1" nextAc="seek">
               <p:cTn id="2" dur="indefinite" nodeType="mainSeq">
@@ -26408,13 +26274,13 @@
   <p:clrMapOvr>
     <a:masterClrMapping/>
   </p:clrMapOvr>
-  <p:transition spd="med">
+  <p:transition xmlns:p14="http://schemas.microsoft.com/office/powerpoint/2010/main" spd="med">
     <p:newsflash/>
   </p:transition>
   <p:timing>
     <p:tnLst>
       <p:par>
-        <p:cTn id="1" dur="indefinite" restart="never" nodeType="tmRoot">
+        <p:cTn xmlns:p14="http://schemas.microsoft.com/office/powerpoint/2010/main" id="1" dur="indefinite" restart="never" nodeType="tmRoot">
           <p:childTnLst>
             <p:seq concurrent="1" nextAc="seek">
               <p:cTn id="2" dur="indefinite" nodeType="mainSeq">
@@ -26976,13 +26842,13 @@
   <p:clrMapOvr>
     <a:masterClrMapping/>
   </p:clrMapOvr>
-  <p:transition spd="med">
+  <p:transition xmlns:p14="http://schemas.microsoft.com/office/powerpoint/2010/main" spd="med">
     <p:newsflash/>
   </p:transition>
   <p:timing>
     <p:tnLst>
       <p:par>
-        <p:cTn id="1" dur="indefinite" restart="never" nodeType="tmRoot">
+        <p:cTn xmlns:p14="http://schemas.microsoft.com/office/powerpoint/2010/main" id="1" dur="indefinite" restart="never" nodeType="tmRoot">
           <p:childTnLst>
             <p:seq concurrent="1" nextAc="seek">
               <p:cTn id="2" dur="indefinite" nodeType="mainSeq">
@@ -27551,7 +27417,7 @@
               <a:buChar char="q"/>
             </a:pPr>
             <a:r>
-              <a:rPr lang="fr-FR" b="1" smtClean="0">
+              <a:rPr lang="fr-FR" b="1" dirty="0" smtClean="0">
                 <a:solidFill>
                   <a:srgbClr val="00B050"/>
                 </a:solidFill>
@@ -27566,7 +27432,7 @@
               <a:buFont typeface="Wingdings" pitchFamily="2" charset="2"/>
               <a:buChar char="q"/>
             </a:pPr>
-            <a:endParaRPr lang="fr-FR" sz="2200" b="1" smtClean="0">
+            <a:endParaRPr lang="fr-FR" sz="2200" b="1" dirty="0" smtClean="0">
               <a:solidFill>
                 <a:srgbClr val="004A99"/>
               </a:solidFill>
@@ -27580,7 +27446,7 @@
               <a:buChar char="-"/>
             </a:pPr>
             <a:r>
-              <a:rPr lang="fr-FR" sz="2200" b="1" smtClean="0">
+              <a:rPr lang="fr-FR" sz="2200" b="1" dirty="0" smtClean="0">
                 <a:solidFill>
                   <a:srgbClr val="004A99"/>
                 </a:solidFill>
@@ -27590,7 +27456,7 @@
               <a:t>Respect d</a:t>
             </a:r>
             <a:r>
-              <a:rPr lang="fr-FR" altLang="fr-FR" sz="2200" b="1" smtClean="0">
+              <a:rPr lang="fr-FR" altLang="fr-FR" sz="2200" b="1" dirty="0" smtClean="0">
                 <a:solidFill>
                   <a:srgbClr val="004A99"/>
                 </a:solidFill>
@@ -27600,7 +27466,7 @@
               <a:t>’</a:t>
             </a:r>
             <a:r>
-              <a:rPr lang="fr-FR" sz="2200" b="1" smtClean="0">
+              <a:rPr lang="fr-FR" sz="2200" b="1" dirty="0" smtClean="0">
                 <a:solidFill>
                   <a:srgbClr val="004A99"/>
                 </a:solidFill>
@@ -27615,7 +27481,7 @@
               <a:buFontTx/>
               <a:buChar char="-"/>
             </a:pPr>
-            <a:endParaRPr lang="fr-FR" sz="2200" b="1" smtClean="0">
+            <a:endParaRPr lang="fr-FR" sz="2200" b="1" dirty="0" smtClean="0">
               <a:solidFill>
                 <a:srgbClr val="004A99"/>
               </a:solidFill>
@@ -27629,14 +27495,24 @@
               <a:buChar char="-"/>
             </a:pPr>
             <a:r>
-              <a:rPr lang="fr-FR" sz="2200" b="1" smtClean="0">
+              <a:rPr lang="fr-FR" sz="2200" b="1" dirty="0" smtClean="0">
                 <a:solidFill>
                   <a:srgbClr val="004A99"/>
                 </a:solidFill>
                 <a:latin typeface="Calibri" pitchFamily="34" charset="0"/>
                 <a:ea typeface="ＭＳ Ｐゴシック" pitchFamily="-84" charset="-128"/>
               </a:rPr>
-              <a:t>Incrément en cycle en V.</a:t>
+              <a:t>Incrément en cycle en V</a:t>
+            </a:r>
+            <a:r>
+              <a:rPr lang="fr-FR" sz="2200" b="1" dirty="0" smtClean="0">
+                <a:solidFill>
+                  <a:srgbClr val="004A99"/>
+                </a:solidFill>
+                <a:latin typeface="Calibri" pitchFamily="34" charset="0"/>
+                <a:ea typeface="ＭＳ Ｐゴシック" pitchFamily="-84" charset="-128"/>
+              </a:rPr>
+              <a:t>.</a:t>
             </a:r>
           </a:p>
           <a:p>
@@ -27644,7 +27520,7 @@
               <a:buFontTx/>
               <a:buChar char="-"/>
             </a:pPr>
-            <a:endParaRPr lang="fr-FR" sz="2200" b="1" smtClean="0">
+            <a:endParaRPr lang="fr-FR" sz="2200" b="1" dirty="0" smtClean="0">
               <a:solidFill>
                 <a:srgbClr val="004A99"/>
               </a:solidFill>
@@ -27657,23 +27533,7 @@
               <a:buFontTx/>
               <a:buChar char="-"/>
             </a:pPr>
-            <a:r>
-              <a:rPr lang="fr-FR" sz="2200" b="1" smtClean="0">
-                <a:solidFill>
-                  <a:srgbClr val="004A99"/>
-                </a:solidFill>
-                <a:latin typeface="Calibri" pitchFamily="34" charset="0"/>
-                <a:ea typeface="ＭＳ Ｐゴシック" pitchFamily="-84" charset="-128"/>
-              </a:rPr>
-              <a:t>Contraintes logicielles et de développement. </a:t>
-            </a:r>
-          </a:p>
-          <a:p>
-            <a:pPr marL="514350" indent="-514350" eaLnBrk="1" hangingPunct="1">
-              <a:buFont typeface="Wingdings 2" pitchFamily="18" charset="2"/>
-              <a:buNone/>
-            </a:pPr>
-            <a:endParaRPr lang="fr-FR" sz="2200" b="1" smtClean="0">
+            <a:endParaRPr lang="fr-FR" sz="2200" b="1" dirty="0" smtClean="0">
               <a:solidFill>
                 <a:srgbClr val="004A99"/>
               </a:solidFill>
@@ -27687,22 +27547,22 @@
               <a:buChar char="-"/>
             </a:pPr>
             <a:r>
-              <a:rPr lang="fr-FR" sz="2200" b="1" smtClean="0">
+              <a:rPr lang="fr-FR" sz="2200" b="1" dirty="0" smtClean="0">
                 <a:solidFill>
                   <a:srgbClr val="004A99"/>
                 </a:solidFill>
                 <a:latin typeface="Calibri" pitchFamily="34" charset="0"/>
                 <a:ea typeface="ＭＳ Ｐゴシック" pitchFamily="-84" charset="-128"/>
               </a:rPr>
-              <a:t>Respect du protocole CAN / CAN Open.</a:t>
+              <a:t>Contraintes logicielles et de développement. </a:t>
             </a:r>
           </a:p>
           <a:p>
             <a:pPr marL="514350" indent="-514350" eaLnBrk="1" hangingPunct="1">
-              <a:buFontTx/>
-              <a:buChar char="-"/>
-            </a:pPr>
-            <a:endParaRPr lang="fr-FR" sz="2200" b="1" smtClean="0">
+              <a:buFont typeface="Wingdings 2" pitchFamily="18" charset="2"/>
+              <a:buNone/>
+            </a:pPr>
+            <a:endParaRPr lang="fr-FR" sz="2200" b="1" dirty="0" smtClean="0">
               <a:solidFill>
                 <a:srgbClr val="004A99"/>
               </a:solidFill>
@@ -27716,7 +27576,36 @@
               <a:buChar char="-"/>
             </a:pPr>
             <a:r>
-              <a:rPr lang="fr-FR" sz="2200" b="1" smtClean="0">
+              <a:rPr lang="fr-FR" sz="2200" b="1" dirty="0" smtClean="0">
+                <a:solidFill>
+                  <a:srgbClr val="004A99"/>
+                </a:solidFill>
+                <a:latin typeface="Calibri" pitchFamily="34" charset="0"/>
+                <a:ea typeface="ＭＳ Ｐゴシック" pitchFamily="-84" charset="-128"/>
+              </a:rPr>
+              <a:t>Respect du protocole CAN / CAN Open.</a:t>
+            </a:r>
+          </a:p>
+          <a:p>
+            <a:pPr marL="514350" indent="-514350" eaLnBrk="1" hangingPunct="1">
+              <a:buFontTx/>
+              <a:buChar char="-"/>
+            </a:pPr>
+            <a:endParaRPr lang="fr-FR" sz="2200" b="1" dirty="0" smtClean="0">
+              <a:solidFill>
+                <a:srgbClr val="004A99"/>
+              </a:solidFill>
+              <a:latin typeface="Calibri" pitchFamily="34" charset="0"/>
+              <a:ea typeface="ＭＳ Ｐゴシック" pitchFamily="-84" charset="-128"/>
+            </a:endParaRPr>
+          </a:p>
+          <a:p>
+            <a:pPr marL="514350" indent="-514350" eaLnBrk="1" hangingPunct="1">
+              <a:buFontTx/>
+              <a:buChar char="-"/>
+            </a:pPr>
+            <a:r>
+              <a:rPr lang="fr-FR" sz="2200" b="1" dirty="0" smtClean="0">
                 <a:solidFill>
                   <a:srgbClr val="004A99"/>
                 </a:solidFill>
@@ -27731,7 +27620,7 @@
               <a:buFontTx/>
               <a:buChar char="-"/>
             </a:pPr>
-            <a:endParaRPr lang="fr-FR" sz="1800" b="1" smtClean="0">
+            <a:endParaRPr lang="fr-FR" sz="1800" b="1" dirty="0" smtClean="0">
               <a:solidFill>
                 <a:srgbClr val="0070C0"/>
               </a:solidFill>
@@ -27744,7 +27633,7 @@
               <a:buFont typeface="Wingdings 2" pitchFamily="18" charset="2"/>
               <a:buNone/>
             </a:pPr>
-            <a:endParaRPr lang="fr-FR" b="1" smtClean="0">
+            <a:endParaRPr lang="fr-FR" b="1" dirty="0" smtClean="0">
               <a:solidFill>
                 <a:srgbClr val="00B050"/>
               </a:solidFill>
@@ -27754,18 +27643,57 @@
           </a:p>
         </p:txBody>
       </p:sp>
+      <p:pic>
+        <p:nvPicPr>
+          <p:cNvPr id="4" name="Image 3" descr="cycleenV.png"/>
+          <p:cNvPicPr>
+            <a:picLocks noChangeAspect="1"/>
+          </p:cNvPicPr>
+          <p:nvPr/>
+        </p:nvPicPr>
+        <p:blipFill>
+          <a:blip r:embed="rId2">
+            <a:extLst>
+              <a:ext uri="{28A0092B-C50C-407E-A947-70E740481C1C}">
+                <a14:useLocalDpi xmlns:a14="http://schemas.microsoft.com/office/drawing/2010/main" val="0"/>
+              </a:ext>
+            </a:extLst>
+          </a:blip>
+          <a:stretch>
+            <a:fillRect/>
+          </a:stretch>
+        </p:blipFill>
+        <p:spPr>
+          <a:xfrm>
+            <a:off x="5004048" y="2204864"/>
+            <a:ext cx="3964676" cy="2304256"/>
+          </a:xfrm>
+          <a:prstGeom prst="rect">
+            <a:avLst/>
+          </a:prstGeom>
+        </p:spPr>
+      </p:pic>
     </p:spTree>
   </p:cSld>
   <p:clrMapOvr>
     <a:masterClrMapping/>
   </p:clrMapOvr>
-  <p:transition spd="med">
-    <p:newsflash/>
-  </p:transition>
+  <mc:AlternateContent xmlns:mc="http://schemas.openxmlformats.org/markup-compatibility/2006">
+    <mc:Choice xmlns:p14="http://schemas.microsoft.com/office/powerpoint/2010/main" Requires="p14">
+      <p:transition spd="slow">
+        <p14:flash/>
+      </p:transition>
+    </mc:Choice>
+    <mc:Fallback>
+      <p:transition xmlns:p14="http://schemas.microsoft.com/office/powerpoint/2010/main" spd="slow">
+        <p:fade/>
+      </p:transition>
+    </mc:Fallback>
+  </mc:AlternateContent>
   <p:timing>
     <p:tnLst>
       <p:par>
-        <p:cTn id="1" dur="indefinite" restart="never" nodeType="tmRoot">
+        <p:cTn xmlns:p14="http://schemas.microsoft.com/office/powerpoint/2010/main" id="1" dur="indefinite" restart="never" nodeType="tmRoot">
           <p:childTnLst>
             <p:seq concurrent="1" nextAc="seek">
               <p:cTn id="2" dur="indefinite" nodeType="mainSeq">
@@ -28045,19 +27973,19 @@
                     </p:cTn>
                   </p:par>
                   <p:par>
-                    <p:cTn id="24" fill="hold" nodeType="clickPar">
+                    <p:cTn id="24" fill="hold">
                       <p:stCondLst>
                         <p:cond delay="indefinite"/>
                       </p:stCondLst>
                       <p:childTnLst>
                         <p:par>
-                          <p:cTn id="25" fill="hold" nodeType="withGroup">
+                          <p:cTn id="25" fill="hold">
                             <p:stCondLst>
                               <p:cond delay="0"/>
                             </p:stCondLst>
                             <p:childTnLst>
                               <p:par>
-                                <p:cTn id="26" presetID="12" presetClass="entr" presetSubtype="4" fill="hold" nodeType="clickEffect">
+                                <p:cTn id="26" presetID="21" presetClass="entr" presetSubtype="1" fill="hold" nodeType="clickEffect">
                                   <p:stCondLst>
                                     <p:cond delay="0"/>
                                   </p:stCondLst>
@@ -28070,11 +27998,7 @@
                                           </p:stCondLst>
                                         </p:cTn>
                                         <p:tgtEl>
-                                          <p:spTgt spid="3">
-                                            <p:txEl>
-                                              <p:pRg st="6" end="6"/>
-                                            </p:txEl>
-                                          </p:spTgt>
+                                          <p:spTgt spid="4"/>
                                         </p:tgtEl>
                                         <p:attrNameLst>
                                           <p:attrName>style.visibility</p:attrName>
@@ -28084,15 +28008,11 @@
                                         <p:strVal val="visible"/>
                                       </p:to>
                                     </p:set>
-                                    <p:animEffect transition="in" filter="slide(fromBottom)">
-                                      <p:cBhvr>
-                                        <p:cTn id="28" dur="500"/>
-                                        <p:tgtEl>
-                                          <p:spTgt spid="3">
-                                            <p:txEl>
-                                              <p:pRg st="6" end="6"/>
-                                            </p:txEl>
-                                          </p:spTgt>
+                                    <p:animEffect transition="in" filter="wheel(1)">
+                                      <p:cBhvr>
+                                        <p:cTn id="28" dur="2000"/>
+                                        <p:tgtEl>
+                                          <p:spTgt spid="4"/>
                                         </p:tgtEl>
                                       </p:cBhvr>
                                     </p:animEffect>
@@ -28106,13 +28026,13 @@
                     </p:cTn>
                   </p:par>
                   <p:par>
-                    <p:cTn id="29" fill="hold" nodeType="clickPar">
+                    <p:cTn id="29" fill="hold">
                       <p:stCondLst>
                         <p:cond delay="indefinite"/>
                       </p:stCondLst>
                       <p:childTnLst>
                         <p:par>
-                          <p:cTn id="30" fill="hold" nodeType="withGroup">
+                          <p:cTn id="30" fill="hold">
                             <p:stCondLst>
                               <p:cond delay="0"/>
                             </p:stCondLst>
@@ -28133,7 +28053,7 @@
                                         <p:tgtEl>
                                           <p:spTgt spid="3">
                                             <p:txEl>
-                                              <p:pRg st="8" end="8"/>
+                                              <p:pRg st="7" end="7"/>
                                             </p:txEl>
                                           </p:spTgt>
                                         </p:tgtEl>
@@ -28151,7 +28071,7 @@
                                         <p:tgtEl>
                                           <p:spTgt spid="3">
                                             <p:txEl>
-                                              <p:pRg st="8" end="8"/>
+                                              <p:pRg st="7" end="7"/>
                                             </p:txEl>
                                           </p:spTgt>
                                         </p:tgtEl>
@@ -28167,13 +28087,13 @@
                     </p:cTn>
                   </p:par>
                   <p:par>
-                    <p:cTn id="34" fill="hold" nodeType="clickPar">
+                    <p:cTn id="34" fill="hold">
                       <p:stCondLst>
                         <p:cond delay="indefinite"/>
                       </p:stCondLst>
                       <p:childTnLst>
                         <p:par>
-                          <p:cTn id="35" fill="hold" nodeType="withGroup">
+                          <p:cTn id="35" fill="hold">
                             <p:stCondLst>
                               <p:cond delay="0"/>
                             </p:stCondLst>
@@ -28194,7 +28114,7 @@
                                         <p:tgtEl>
                                           <p:spTgt spid="3">
                                             <p:txEl>
-                                              <p:pRg st="10" end="10"/>
+                                              <p:pRg st="9" end="9"/>
                                             </p:txEl>
                                           </p:spTgt>
                                         </p:tgtEl>
@@ -28212,7 +28132,68 @@
                                         <p:tgtEl>
                                           <p:spTgt spid="3">
                                             <p:txEl>
-                                              <p:pRg st="10" end="10"/>
+                                              <p:pRg st="9" end="9"/>
+                                            </p:txEl>
+                                          </p:spTgt>
+                                        </p:tgtEl>
+                                      </p:cBhvr>
+                                    </p:animEffect>
+                                  </p:childTnLst>
+                                </p:cTn>
+                              </p:par>
+                            </p:childTnLst>
+                          </p:cTn>
+                        </p:par>
+                      </p:childTnLst>
+                    </p:cTn>
+                  </p:par>
+                  <p:par>
+                    <p:cTn id="39" fill="hold">
+                      <p:stCondLst>
+                        <p:cond delay="indefinite"/>
+                      </p:stCondLst>
+                      <p:childTnLst>
+                        <p:par>
+                          <p:cTn id="40" fill="hold">
+                            <p:stCondLst>
+                              <p:cond delay="0"/>
+                            </p:stCondLst>
+                            <p:childTnLst>
+                              <p:par>
+                                <p:cTn id="41" presetID="12" presetClass="entr" presetSubtype="4" fill="hold" nodeType="clickEffect">
+                                  <p:stCondLst>
+                                    <p:cond delay="0"/>
+                                  </p:stCondLst>
+                                  <p:childTnLst>
+                                    <p:set>
+                                      <p:cBhvr>
+                                        <p:cTn id="42" dur="1" fill="hold">
+                                          <p:stCondLst>
+                                            <p:cond delay="0"/>
+                                          </p:stCondLst>
+                                        </p:cTn>
+                                        <p:tgtEl>
+                                          <p:spTgt spid="3">
+                                            <p:txEl>
+                                              <p:pRg st="11" end="11"/>
+                                            </p:txEl>
+                                          </p:spTgt>
+                                        </p:tgtEl>
+                                        <p:attrNameLst>
+                                          <p:attrName>style.visibility</p:attrName>
+                                        </p:attrNameLst>
+                                      </p:cBhvr>
+                                      <p:to>
+                                        <p:strVal val="visible"/>
+                                      </p:to>
+                                    </p:set>
+                                    <p:animEffect transition="in" filter="slide(fromBottom)">
+                                      <p:cBhvr>
+                                        <p:cTn id="43" dur="500"/>
+                                        <p:tgtEl>
+                                          <p:spTgt spid="3">
+                                            <p:txEl>
+                                              <p:pRg st="11" end="11"/>
                                             </p:txEl>
                                           </p:spTgt>
                                         </p:tgtEl>
@@ -28524,13 +28505,13 @@
   <p:clrMapOvr>
     <a:masterClrMapping/>
   </p:clrMapOvr>
-  <p:transition spd="med">
+  <p:transition xmlns:p14="http://schemas.microsoft.com/office/powerpoint/2010/main" spd="med">
     <p:newsflash/>
   </p:transition>
   <p:timing>
     <p:tnLst>
       <p:par>
-        <p:cTn id="1" dur="indefinite" restart="never" nodeType="tmRoot">
+        <p:cTn xmlns:p14="http://schemas.microsoft.com/office/powerpoint/2010/main" id="1" dur="indefinite" restart="never" nodeType="tmRoot">
           <p:childTnLst>
             <p:seq concurrent="1" nextAc="seek">
               <p:cTn id="2" dur="indefinite" nodeType="mainSeq">
@@ -29345,25 +29326,8 @@
                 <a:latin typeface="Calibri" pitchFamily="34" charset="0"/>
                 <a:ea typeface="ＭＳ Ｐゴシック" pitchFamily="-84" charset="-128"/>
               </a:rPr>
-              <a:t>     		 Objets </a:t>
-            </a:r>
-            <a:r>
-              <a:rPr lang="fr-FR" sz="2400" b="1" dirty="0" smtClean="0">
-                <a:solidFill>
-                  <a:srgbClr val="004A99"/>
-                </a:solidFill>
-                <a:latin typeface="Calibri" pitchFamily="34" charset="0"/>
-                <a:ea typeface="ＭＳ Ｐゴシック" pitchFamily="-84" charset="-128"/>
-              </a:rPr>
-              <a:t>métiers</a:t>
-            </a:r>
-            <a:endParaRPr lang="fr-FR" sz="2400" b="1" dirty="0" smtClean="0">
-              <a:solidFill>
-                <a:srgbClr val="004A99"/>
-              </a:solidFill>
-              <a:latin typeface="Calibri" pitchFamily="34" charset="0"/>
-              <a:ea typeface="ＭＳ Ｐゴシック" pitchFamily="-84" charset="-128"/>
-            </a:endParaRPr>
+              <a:t>     		 Objets métiers</a:t>
+            </a:r>
           </a:p>
           <a:p>
             <a:pPr algn="r" eaLnBrk="1" hangingPunct="1">
@@ -29443,13 +29407,13 @@
   <p:clrMapOvr>
     <a:masterClrMapping/>
   </p:clrMapOvr>
-  <p:transition spd="med">
+  <p:transition xmlns:p14="http://schemas.microsoft.com/office/powerpoint/2010/main" spd="med">
     <p:newsflash/>
   </p:transition>
   <p:timing>
     <p:tnLst>
       <p:par>
-        <p:cTn id="1" dur="indefinite" restart="never" nodeType="tmRoot">
+        <p:cTn xmlns:p14="http://schemas.microsoft.com/office/powerpoint/2010/main" id="1" dur="indefinite" restart="never" nodeType="tmRoot">
           <p:childTnLst>
             <p:seq concurrent="1" nextAc="seek">
               <p:cTn id="2" dur="indefinite" nodeType="mainSeq">

</xml_diff>